<commit_message>
updates for chapter 1
</commit_message>
<xml_diff>
--- a/2022秋季-数据结构-第1章-概论.pptx
+++ b/2022秋季-数据结构-第1章-概论.pptx
@@ -128,7 +128,7 @@
       </a:defRPr>
     </a:lvl9pPr>
   </p:defaultTextStyle>
-  <p:modifyVerifier cryptProviderType="rsaFull" cryptAlgorithmClass="hash" cryptAlgorithmType="typeAny" cryptAlgorithmSid="4" spinCount="100000" saltData="BBagLezGUxqjHfcy/UwcPA==" hashData="Vg6dqzMoW4RdytsytrJTpEmDIlg="/>
+  <p:modifyVerifier cryptProviderType="rsaFull" cryptAlgorithmClass="hash" cryptAlgorithmType="typeAny" cryptAlgorithmSid="4" spinCount="100000" saltData="2SZXpxSn8mz3lpLUS9mf6Q==" hashData="cdKw0XofCxkWQQG/5Ml4ryFrT5k="/>
 </p:presentation>
 </file>
 
@@ -5525,7 +5525,23 @@
                 <a:ea typeface="黑体" charset="0"/>
                 <a:sym typeface="+mn-ea"/>
               </a:rPr>
-              <a:t>1:随便放</a:t>
+              <a:t>1</a:t>
+            </a:r>
+            <a:r>
+              <a:rPr lang="zh-CN" altLang="en-US">
+                <a:latin typeface="黑体" charset="0"/>
+                <a:ea typeface="黑体" charset="0"/>
+                <a:sym typeface="+mn-ea"/>
+              </a:rPr>
+              <a:t>：</a:t>
+            </a:r>
+            <a:r>
+              <a:rPr lang="en-US" altLang="zh-CN">
+                <a:latin typeface="黑体" charset="0"/>
+                <a:ea typeface="黑体" charset="0"/>
+                <a:sym typeface="+mn-ea"/>
+              </a:rPr>
+              <a:t>随便放</a:t>
             </a:r>
             <a:endParaRPr lang="en-US" altLang="zh-CN">
               <a:latin typeface="黑体" charset="0"/>
@@ -5554,7 +5570,23 @@
                 <a:ea typeface="黑体" charset="0"/>
                 <a:sym typeface="+mn-ea"/>
               </a:rPr>
-              <a:t>2:按照书名的拼音字母顺序排放</a:t>
+              <a:t>2</a:t>
+            </a:r>
+            <a:r>
+              <a:rPr lang="zh-CN" altLang="en-US">
+                <a:latin typeface="黑体" charset="0"/>
+                <a:ea typeface="黑体" charset="0"/>
+                <a:sym typeface="+mn-ea"/>
+              </a:rPr>
+              <a:t>：</a:t>
+            </a:r>
+            <a:r>
+              <a:rPr lang="en-US" altLang="zh-CN">
+                <a:latin typeface="黑体" charset="0"/>
+                <a:ea typeface="黑体" charset="0"/>
+                <a:sym typeface="+mn-ea"/>
+              </a:rPr>
+              <a:t>按照书名的拼音字母顺序排放</a:t>
             </a:r>
             <a:endParaRPr lang="en-US" altLang="zh-CN">
               <a:latin typeface="黑体" charset="0"/>
@@ -5583,7 +5615,23 @@
                 <a:ea typeface="黑体" charset="0"/>
                 <a:sym typeface="+mn-ea"/>
               </a:rPr>
-              <a:t>3:把书架划分成几块区域，每块区域指定摆放某种类别的图书；在每种类别内，按照书名的拼音字母顺序排放</a:t>
+              <a:t>3</a:t>
+            </a:r>
+            <a:r>
+              <a:rPr lang="zh-CN" altLang="en-US">
+                <a:latin typeface="黑体" charset="0"/>
+                <a:ea typeface="黑体" charset="0"/>
+                <a:sym typeface="+mn-ea"/>
+              </a:rPr>
+              <a:t>：</a:t>
+            </a:r>
+            <a:r>
+              <a:rPr lang="en-US" altLang="zh-CN">
+                <a:latin typeface="黑体" charset="0"/>
+                <a:ea typeface="黑体" charset="0"/>
+                <a:sym typeface="+mn-ea"/>
+              </a:rPr>
+              <a:t>把书架划分成几块区域，每块区域指定摆放某种类别的图书；在每种类别内，按照书名的拼音字母顺序排放</a:t>
             </a:r>
             <a:endParaRPr lang="en-US" altLang="zh-CN">
               <a:latin typeface="黑体" charset="0"/>
@@ -5625,7 +5673,7 @@
                 <a:ea typeface="黑体" charset="0"/>
                 <a:sym typeface="+mn-ea"/>
               </a:rPr>
-              <a:t>1:</a:t>
+              <a:t>1</a:t>
             </a:r>
             <a:r>
               <a:rPr lang="zh-CN" altLang="en-US">
@@ -5633,7 +5681,7 @@
                 <a:ea typeface="黑体" charset="0"/>
                 <a:sym typeface="+mn-ea"/>
               </a:rPr>
-              <a:t>查找效率极</a:t>
+              <a:t>：查找效率极</a:t>
             </a:r>
             <a:r>
               <a:rPr lang="zh-CN" altLang="en-US">
@@ -5641,7 +5689,7 @@
                 <a:ea typeface="黑体" charset="0"/>
                 <a:sym typeface="+mn-ea"/>
               </a:rPr>
-              <a:t>低；</a:t>
+              <a:t>低</a:t>
             </a:r>
             <a:endParaRPr lang="zh-CN" altLang="en-US">
               <a:latin typeface="黑体" charset="0"/>
@@ -5670,7 +5718,23 @@
                 <a:ea typeface="黑体" charset="0"/>
                 <a:sym typeface="+mn-ea"/>
               </a:rPr>
-              <a:t>2:有时插入新书很困难</a:t>
+              <a:t>2</a:t>
+            </a:r>
+            <a:r>
+              <a:rPr lang="zh-CN" altLang="en-US">
+                <a:latin typeface="黑体" charset="0"/>
+                <a:ea typeface="黑体" charset="0"/>
+                <a:sym typeface="+mn-ea"/>
+              </a:rPr>
+              <a:t>：</a:t>
+            </a:r>
+            <a:r>
+              <a:rPr lang="en-US" altLang="zh-CN">
+                <a:latin typeface="黑体" charset="0"/>
+                <a:ea typeface="黑体" charset="0"/>
+                <a:sym typeface="+mn-ea"/>
+              </a:rPr>
+              <a:t>有时插入新书很困难</a:t>
             </a:r>
             <a:endParaRPr lang="en-US" altLang="zh-CN">
               <a:latin typeface="黑体" charset="0"/>
@@ -5699,7 +5763,23 @@
                 <a:ea typeface="黑体" charset="0"/>
                 <a:sym typeface="+mn-ea"/>
               </a:rPr>
-              <a:t>3:可能造成空间的浪费</a:t>
+              <a:t>3</a:t>
+            </a:r>
+            <a:r>
+              <a:rPr lang="zh-CN" altLang="en-US">
+                <a:latin typeface="黑体" charset="0"/>
+                <a:ea typeface="黑体" charset="0"/>
+                <a:sym typeface="+mn-ea"/>
+              </a:rPr>
+              <a:t>：</a:t>
+            </a:r>
+            <a:r>
+              <a:rPr lang="en-US" altLang="zh-CN">
+                <a:latin typeface="黑体" charset="0"/>
+                <a:ea typeface="黑体" charset="0"/>
+                <a:sym typeface="+mn-ea"/>
+              </a:rPr>
+              <a:t>可能造成空间的浪费</a:t>
             </a:r>
             <a:endParaRPr lang="en-US" altLang="zh-CN">
               <a:latin typeface="黑体" charset="0"/>
@@ -5783,7 +5863,7 @@
                 <a:ea typeface="黑体" charset="0"/>
                 <a:sym typeface="+mn-ea"/>
               </a:rPr>
-              <a:t>函数PrintN：得传入一个正整数为N的参数后，能顺序打印从1到N的全部正整数</a:t>
+              <a:t>函数PrintN：传入一个正整数为N的参数后，能顺序打印从1到N的全部正整数</a:t>
             </a:r>
             <a:endParaRPr lang="zh-CN" altLang="en-US">
               <a:latin typeface="黑体" charset="0"/>

</xml_diff>